<commit_message>
Inputs from Neil, Tommy and Tiru
</commit_message>
<xml_diff>
--- a/Interim-01-2021/draft-btw-add-home-Interim012021.pptx
+++ b/Interim-01-2021/draft-btw-add-home-Interim012021.pptx
@@ -5,18 +5,15 @@
     <p:sldMasterId id="2147483648" r:id="rId1"/>
   </p:sldMasterIdLst>
   <p:notesMasterIdLst>
-    <p:notesMasterId r:id="rId11"/>
+    <p:notesMasterId r:id="rId8"/>
   </p:notesMasterIdLst>
   <p:sldIdLst>
     <p:sldId id="395" r:id="rId2"/>
     <p:sldId id="489" r:id="rId3"/>
     <p:sldId id="485" r:id="rId4"/>
     <p:sldId id="491" r:id="rId5"/>
-    <p:sldId id="487" r:id="rId6"/>
-    <p:sldId id="488" r:id="rId7"/>
-    <p:sldId id="492" r:id="rId8"/>
-    <p:sldId id="493" r:id="rId9"/>
-    <p:sldId id="403" r:id="rId10"/>
+    <p:sldId id="488" r:id="rId6"/>
+    <p:sldId id="403" r:id="rId7"/>
   </p:sldIdLst>
   <p:sldSz cx="9144000" cy="6858000" type="screen4x3"/>
   <p:notesSz cx="6858000" cy="9144000"/>
@@ -230,7 +227,7 @@
           <a:p>
             <a:fld id="{6BE512B3-EE07-42D7-BB92-D931EE959D3C}" type="datetimeFigureOut">
               <a:rPr lang="fr-FR" smtClean="0"/>
-              <a:t>22/01/2021</a:t>
+              <a:t>25/01/2021</a:t>
             </a:fld>
             <a:endParaRPr lang="fr-FR"/>
           </a:p>
@@ -679,7 +676,7 @@
           <a:p>
             <a:fld id="{AA309A6D-C09C-4548-B29A-6CF363A7E532}" type="datetimeFigureOut">
               <a:rPr lang="fr-FR" smtClean="0"/>
-              <a:t>22/01/2021</a:t>
+              <a:t>25/01/2021</a:t>
             </a:fld>
             <a:endParaRPr lang="fr-BE"/>
           </a:p>
@@ -1031,7 +1028,7 @@
           <a:p>
             <a:fld id="{AA309A6D-C09C-4548-B29A-6CF363A7E532}" type="datetimeFigureOut">
               <a:rPr lang="fr-FR" smtClean="0"/>
-              <a:t>22/01/2021</a:t>
+              <a:t>25/01/2021</a:t>
             </a:fld>
             <a:endParaRPr lang="fr-BE"/>
           </a:p>
@@ -1206,7 +1203,7 @@
           <a:p>
             <a:fld id="{AA309A6D-C09C-4548-B29A-6CF363A7E532}" type="datetimeFigureOut">
               <a:rPr lang="fr-FR" smtClean="0"/>
-              <a:t>22/01/2021</a:t>
+              <a:t>25/01/2021</a:t>
             </a:fld>
             <a:endParaRPr lang="fr-BE"/>
           </a:p>
@@ -1371,7 +1368,7 @@
           <a:p>
             <a:fld id="{AA309A6D-C09C-4548-B29A-6CF363A7E532}" type="datetimeFigureOut">
               <a:rPr lang="fr-FR" smtClean="0"/>
-              <a:t>22/01/2021</a:t>
+              <a:t>25/01/2021</a:t>
             </a:fld>
             <a:endParaRPr lang="fr-BE"/>
           </a:p>
@@ -1799,7 +1796,7 @@
           <a:p>
             <a:fld id="{AA309A6D-C09C-4548-B29A-6CF363A7E532}" type="datetimeFigureOut">
               <a:rPr lang="fr-FR" smtClean="0"/>
-              <a:t>22/01/2021</a:t>
+              <a:t>25/01/2021</a:t>
             </a:fld>
             <a:endParaRPr lang="fr-BE"/>
           </a:p>
@@ -2269,7 +2266,7 @@
           <a:p>
             <a:fld id="{AA309A6D-C09C-4548-B29A-6CF363A7E532}" type="datetimeFigureOut">
               <a:rPr lang="fr-FR" smtClean="0"/>
-              <a:t>22/01/2021</a:t>
+              <a:t>25/01/2021</a:t>
             </a:fld>
             <a:endParaRPr lang="fr-BE"/>
           </a:p>
@@ -2693,7 +2690,7 @@
           <a:p>
             <a:fld id="{AA309A6D-C09C-4548-B29A-6CF363A7E532}" type="datetimeFigureOut">
               <a:rPr lang="fr-FR" smtClean="0"/>
-              <a:t>22/01/2021</a:t>
+              <a:t>25/01/2021</a:t>
             </a:fld>
             <a:endParaRPr lang="fr-BE"/>
           </a:p>
@@ -2806,7 +2803,7 @@
           <a:p>
             <a:fld id="{AA309A6D-C09C-4548-B29A-6CF363A7E532}" type="datetimeFigureOut">
               <a:rPr lang="fr-FR" smtClean="0"/>
-              <a:t>22/01/2021</a:t>
+              <a:t>25/01/2021</a:t>
             </a:fld>
             <a:endParaRPr lang="fr-BE"/>
           </a:p>
@@ -2896,7 +2893,7 @@
           <a:p>
             <a:fld id="{AA309A6D-C09C-4548-B29A-6CF363A7E532}" type="datetimeFigureOut">
               <a:rPr lang="fr-FR" smtClean="0"/>
-              <a:t>22/01/2021</a:t>
+              <a:t>25/01/2021</a:t>
             </a:fld>
             <a:endParaRPr lang="fr-BE"/>
           </a:p>
@@ -3168,7 +3165,7 @@
           <a:p>
             <a:fld id="{AA309A6D-C09C-4548-B29A-6CF363A7E532}" type="datetimeFigureOut">
               <a:rPr lang="fr-FR" smtClean="0"/>
-              <a:t>22/01/2021</a:t>
+              <a:t>25/01/2021</a:t>
             </a:fld>
             <a:endParaRPr lang="fr-BE"/>
           </a:p>
@@ -3416,7 +3413,7 @@
           <a:p>
             <a:fld id="{AA309A6D-C09C-4548-B29A-6CF363A7E532}" type="datetimeFigureOut">
               <a:rPr lang="fr-FR" smtClean="0"/>
-              <a:t>22/01/2021</a:t>
+              <a:t>25/01/2021</a:t>
             </a:fld>
             <a:endParaRPr lang="fr-BE"/>
           </a:p>
@@ -3624,7 +3621,7 @@
           <a:p>
             <a:fld id="{AA309A6D-C09C-4548-B29A-6CF363A7E532}" type="datetimeFigureOut">
               <a:rPr lang="fr-FR" smtClean="0"/>
-              <a:t>22/01/2021</a:t>
+              <a:t>25/01/2021</a:t>
             </a:fld>
             <a:endParaRPr lang="fr-BE"/>
           </a:p>
@@ -4089,11 +4086,6 @@
               </a:rPr>
               <a:t>January 2021</a:t>
             </a:r>
-            <a:endParaRPr lang="en-US" dirty="0" smtClean="0">
-              <a:solidFill>
-                <a:schemeClr val="tx1"/>
-              </a:solidFill>
-            </a:endParaRPr>
           </a:p>
           <a:p>
             <a:r>
@@ -4138,11 +4130,7 @@
             </a:r>
             <a:r>
               <a:rPr lang="en-US" dirty="0" smtClean="0"/>
-              <a:t>(Open-Xchange</a:t>
-            </a:r>
-            <a:r>
-              <a:rPr lang="en-US" dirty="0" smtClean="0"/>
-              <a:t>)</a:t>
+              <a:t>(Open-Xchange)</a:t>
             </a:r>
           </a:p>
           <a:p>
@@ -4154,7 +4142,6 @@
               <a:rPr lang="en-US" dirty="0" smtClean="0"/>
               <a:t>Jensen (Microsoft)</a:t>
             </a:r>
-            <a:endParaRPr lang="en-US" dirty="0" smtClean="0"/>
           </a:p>
         </p:txBody>
       </p:sp>
@@ -4237,19 +4224,11 @@
           <a:p>
             <a:r>
               <a:rPr lang="en-US" sz="2400" dirty="0" smtClean="0"/>
-              <a:t>Rely upon existing mechanisms to distribute DNS server </a:t>
-            </a:r>
-            <a:r>
-              <a:rPr lang="en-US" sz="2400" dirty="0" smtClean="0"/>
-              <a:t>information: </a:t>
+              <a:t>Rely upon existing mechanisms to distribute DNS server information: </a:t>
             </a:r>
             <a:r>
               <a:rPr lang="en-US" sz="2000" dirty="0" smtClean="0"/>
-              <a:t>DHCP</a:t>
-            </a:r>
-            <a:r>
-              <a:rPr lang="en-US" sz="2000" dirty="0" smtClean="0"/>
-              <a:t>, DHCPv6, and </a:t>
+              <a:t>DHCP, DHCPv6, and </a:t>
             </a:r>
             <a:r>
               <a:rPr lang="en-US" sz="2000" dirty="0" smtClean="0"/>
@@ -4269,18 +4248,43 @@
             </a:r>
             <a:r>
               <a:rPr lang="en-US" sz="2400" dirty="0" smtClean="0"/>
-              <a:t>communication flow:</a:t>
-            </a:r>
+              <a:t>communication </a:t>
+            </a:r>
+            <a:r>
+              <a:rPr lang="en-US" sz="2400" dirty="0" smtClean="0"/>
+              <a:t>flow</a:t>
+            </a:r>
+            <a:endParaRPr lang="en-US" sz="2400" dirty="0" smtClean="0"/>
           </a:p>
           <a:p>
             <a:pPr lvl="1"/>
             <a:r>
               <a:rPr lang="en-US" sz="2000" dirty="0" smtClean="0"/>
-              <a:t>Clients ask for one or more Encrypted DNS (e.g., DoT, DoH</a:t>
+              <a:t>Clients ask for one or more </a:t>
             </a:r>
             <a:r>
               <a:rPr lang="en-US" sz="2000" dirty="0" smtClean="0"/>
-              <a:t>) by setting dedicated flags in the options</a:t>
+              <a:t>encrypted </a:t>
+            </a:r>
+            <a:r>
+              <a:rPr lang="en-US" sz="2000" dirty="0" smtClean="0"/>
+              <a:t>DNS (e.g., DoT, DoH) by </a:t>
+            </a:r>
+            <a:r>
+              <a:rPr lang="en-US" sz="2000" b="1" i="1" dirty="0" smtClean="0">
+                <a:solidFill>
+                  <a:srgbClr val="00B0F0"/>
+                </a:solidFill>
+              </a:rPr>
+              <a:t>setting dedicated flags</a:t>
+            </a:r>
+            <a:r>
+              <a:rPr lang="en-US" sz="2000" dirty="0" smtClean="0"/>
+              <a:t> in the </a:t>
+            </a:r>
+            <a:r>
+              <a:rPr lang="en-US" sz="2000" dirty="0" smtClean="0"/>
+              <a:t>options</a:t>
             </a:r>
             <a:endParaRPr lang="en-US" sz="2000" dirty="0" smtClean="0"/>
           </a:p>
@@ -4288,66 +4292,146 @@
             <a:pPr lvl="1"/>
             <a:r>
               <a:rPr lang="en-US" sz="2000" dirty="0" smtClean="0"/>
-              <a:t>Servers reply with ADN(s</a:t>
-            </a:r>
-            <a:r>
-              <a:rPr lang="en-US" sz="2000" dirty="0" smtClean="0"/>
-              <a:t>), a list of IP addresses, and a port number, if </a:t>
-            </a:r>
-            <a:r>
-              <a:rPr lang="en-US" sz="2000" dirty="0" smtClean="0"/>
-              <a:t>the </a:t>
-            </a:r>
-            <a:r>
-              <a:rPr lang="en-US" sz="2000" dirty="0" smtClean="0"/>
-              <a:t>requested encrypted </a:t>
-            </a:r>
-            <a:r>
-              <a:rPr lang="en-US" sz="2000" dirty="0" smtClean="0"/>
-              <a:t>DNS is </a:t>
-            </a:r>
-            <a:r>
-              <a:rPr lang="en-US" sz="2000" dirty="0" smtClean="0"/>
-              <a:t>supported</a:t>
+              <a:t>Servers reply with ADN(s), a list of IP addresses, and a port number, if the requested encrypted DNS is supported</a:t>
             </a:r>
           </a:p>
           <a:p>
             <a:pPr lvl="2"/>
             <a:r>
               <a:rPr lang="en-US" sz="1600" dirty="0" smtClean="0"/>
-              <a:t>RECOMMENDED to return both an ADD and a list of IP addresses</a:t>
+              <a:t>It is </a:t>
+            </a:r>
+            <a:r>
+              <a:rPr lang="en-US" sz="1600" b="1" i="1" dirty="0" smtClean="0">
+                <a:solidFill>
+                  <a:srgbClr val="00B0F0"/>
+                </a:solidFill>
+              </a:rPr>
+              <a:t>RECOMMENDED </a:t>
+            </a:r>
+            <a:r>
+              <a:rPr lang="en-US" sz="1600" b="1" i="1" dirty="0" smtClean="0">
+                <a:solidFill>
+                  <a:srgbClr val="00B0F0"/>
+                </a:solidFill>
+              </a:rPr>
+              <a:t>to return both an </a:t>
+            </a:r>
+            <a:r>
+              <a:rPr lang="en-US" sz="1600" b="1" i="1" dirty="0" smtClean="0">
+                <a:solidFill>
+                  <a:srgbClr val="00B0F0"/>
+                </a:solidFill>
+              </a:rPr>
+              <a:t>ADN + a </a:t>
+            </a:r>
+            <a:r>
+              <a:rPr lang="en-US" sz="1600" b="1" i="1" dirty="0" smtClean="0">
+                <a:solidFill>
+                  <a:srgbClr val="00B0F0"/>
+                </a:solidFill>
+              </a:rPr>
+              <a:t>list of IP addresses</a:t>
             </a:r>
           </a:p>
           <a:p>
             <a:pPr lvl="2"/>
             <a:r>
+              <a:rPr lang="en-US" sz="1600" b="1" i="1" dirty="0" smtClean="0">
+                <a:solidFill>
+                  <a:srgbClr val="00B0F0"/>
+                </a:solidFill>
+              </a:rPr>
+              <a:t>One or more </a:t>
+            </a:r>
+            <a:r>
               <a:rPr lang="en-US" sz="1600" dirty="0" smtClean="0"/>
-              <a:t>One or more Encrypted DNS types may be returned</a:t>
+              <a:t>encrypted </a:t>
+            </a:r>
+            <a:r>
+              <a:rPr lang="en-US" sz="1600" dirty="0" smtClean="0"/>
+              <a:t>DNS types may be returned</a:t>
             </a:r>
           </a:p>
           <a:p>
             <a:pPr lvl="2"/>
             <a:r>
               <a:rPr lang="en-US" sz="1600" dirty="0" smtClean="0"/>
-              <a:t>These services may listen on the same or distinct IP addresses</a:t>
+              <a:t>These services may listen on the </a:t>
+            </a:r>
+            <a:r>
+              <a:rPr lang="en-US" sz="1600" b="1" i="1" dirty="0" smtClean="0">
+                <a:solidFill>
+                  <a:srgbClr val="00B0F0"/>
+                </a:solidFill>
+              </a:rPr>
+              <a:t>same or distinct IP addresses</a:t>
             </a:r>
           </a:p>
           <a:p>
             <a:pPr lvl="2"/>
             <a:r>
+              <a:rPr lang="en-US" sz="1600" b="1" i="1" dirty="0" smtClean="0">
+                <a:solidFill>
+                  <a:srgbClr val="00B0F0"/>
+                </a:solidFill>
+              </a:rPr>
+              <a:t>Alternate port numbers </a:t>
+            </a:r>
+            <a:r>
               <a:rPr lang="en-US" sz="1600" dirty="0" smtClean="0"/>
-              <a:t>Alternate port numbers can be returned when default port are not in use</a:t>
+              <a:t>can be returned when default </a:t>
+            </a:r>
+            <a:r>
+              <a:rPr lang="en-US" sz="1600" dirty="0" smtClean="0"/>
+              <a:t>port number are </a:t>
+            </a:r>
+            <a:r>
+              <a:rPr lang="en-US" sz="1600" dirty="0" smtClean="0"/>
+              <a:t>not in use</a:t>
             </a:r>
           </a:p>
           <a:p>
             <a:pPr lvl="2"/>
             <a:r>
               <a:rPr lang="en-US" sz="1600" dirty="0" smtClean="0"/>
-              <a:t>If a list of IP addresses is returned, that list is ordered</a:t>
+              <a:t>If a list of IP addresses is returned, that list is </a:t>
+            </a:r>
+            <a:r>
+              <a:rPr lang="en-US" sz="1600" b="1" i="1" dirty="0" smtClean="0">
+                <a:solidFill>
+                  <a:srgbClr val="00B0F0"/>
+                </a:solidFill>
+              </a:rPr>
+              <a:t>ordered</a:t>
             </a:r>
           </a:p>
           <a:p>
             <a:pPr lvl="2"/>
+            <a:r>
+              <a:rPr lang="en-US" sz="1600" dirty="0" smtClean="0"/>
+              <a:t>Some recommendations to </a:t>
+            </a:r>
+            <a:r>
+              <a:rPr lang="en-US" sz="1600" b="1" i="1" dirty="0" smtClean="0">
+                <a:solidFill>
+                  <a:srgbClr val="00B0F0"/>
+                </a:solidFill>
+              </a:rPr>
+              <a:t>optimize</a:t>
+            </a:r>
+            <a:r>
+              <a:rPr lang="en-US" sz="1600" dirty="0" smtClean="0">
+                <a:solidFill>
+                  <a:srgbClr val="00B0F0"/>
+                </a:solidFill>
+              </a:rPr>
+              <a:t> </a:t>
+            </a:r>
+            <a:r>
+              <a:rPr lang="en-US" sz="1600" dirty="0" smtClean="0"/>
+              <a:t>the message size are included</a:t>
+            </a:r>
             <a:endParaRPr lang="en-US" sz="1600" dirty="0" smtClean="0"/>
           </a:p>
         </p:txBody>
@@ -4432,115 +4516,106 @@
         </p:nvSpPr>
         <p:spPr/>
         <p:txBody>
-          <a:bodyPr/>
+          <a:bodyPr>
+            <a:normAutofit fontScale="92500" lnSpcReduction="20000"/>
+          </a:bodyPr>
           <a:lstStyle/>
           <a:p>
             <a:r>
-              <a:rPr lang="fr-FR" dirty="0" smtClean="0"/>
-              <a:t>A list of IP </a:t>
-            </a:r>
-            <a:r>
-              <a:rPr lang="fr-FR" dirty="0" err="1" smtClean="0"/>
-              <a:t>addresses</a:t>
-            </a:r>
-            <a:r>
-              <a:rPr lang="fr-FR" dirty="0" smtClean="0"/>
+              <a:rPr lang="en-US" dirty="0" smtClean="0"/>
+              <a:t>Return </a:t>
+            </a:r>
+            <a:r>
+              <a:rPr lang="en-US" dirty="0" smtClean="0"/>
+              <a:t>a list of IP addresses instead of relying upon legacy DNS options</a:t>
+            </a:r>
+          </a:p>
+          <a:p>
+            <a:pPr lvl="1"/>
+            <a:r>
+              <a:rPr lang="en-US" dirty="0" smtClean="0"/>
+              <a:t>This is to </a:t>
+            </a:r>
+            <a:r>
+              <a:rPr lang="en-US" b="1" i="1" dirty="0" smtClean="0">
+                <a:solidFill>
+                  <a:srgbClr val="00B0F0"/>
+                </a:solidFill>
+              </a:rPr>
+              <a:t>avoid probing</a:t>
+            </a:r>
+          </a:p>
+          <a:p>
+            <a:pPr lvl="1"/>
+            <a:r>
+              <a:rPr lang="en-US" dirty="0" smtClean="0"/>
+              <a:t>Useful if available encrypted DNS services are not available on the same IP address(</a:t>
+            </a:r>
+            <a:r>
+              <a:rPr lang="en-US" dirty="0" err="1" smtClean="0"/>
+              <a:t>es</a:t>
+            </a:r>
+            <a:r>
+              <a:rPr lang="en-US" dirty="0" smtClean="0"/>
+              <a:t>)</a:t>
+            </a:r>
+            <a:endParaRPr lang="en-US" dirty="0" smtClean="0"/>
+          </a:p>
+          <a:p>
+            <a:endParaRPr lang="en-US" b="1" i="1" dirty="0" smtClean="0"/>
+          </a:p>
+          <a:p>
+            <a:r>
+              <a:rPr lang="en-US" b="1" i="1" dirty="0" smtClean="0">
+                <a:solidFill>
+                  <a:srgbClr val="00B0F0"/>
+                </a:solidFill>
+              </a:rPr>
+              <a:t>Generalize</a:t>
+            </a:r>
+            <a:r>
+              <a:rPr lang="en-US" dirty="0" smtClean="0">
+                <a:solidFill>
+                  <a:srgbClr val="00B0F0"/>
+                </a:solidFill>
+              </a:rPr>
               <a:t> </a:t>
             </a:r>
             <a:r>
-              <a:rPr lang="fr-FR" dirty="0" err="1" smtClean="0"/>
-              <a:t>instead</a:t>
-            </a:r>
-            <a:r>
-              <a:rPr lang="fr-FR" dirty="0" smtClean="0"/>
-              <a:t> of </a:t>
-            </a:r>
-            <a:r>
-              <a:rPr lang="fr-FR" dirty="0" err="1" smtClean="0"/>
-              <a:t>relying</a:t>
-            </a:r>
-            <a:r>
-              <a:rPr lang="fr-FR" dirty="0" smtClean="0"/>
+              <a:rPr lang="en-US" dirty="0" smtClean="0"/>
+              <a:t>the specification so tha</a:t>
+            </a:r>
+            <a:r>
+              <a:rPr lang="en-US" dirty="0" smtClean="0"/>
+              <a:t>t the options are not tied with a particular deployment</a:t>
+            </a:r>
+            <a:endParaRPr lang="en-US" dirty="0" smtClean="0"/>
+          </a:p>
+          <a:p>
+            <a:endParaRPr lang="en-US" b="1" i="1" dirty="0" smtClean="0"/>
+          </a:p>
+          <a:p>
+            <a:r>
+              <a:rPr lang="en-US" b="1" i="1" dirty="0" smtClean="0">
+                <a:solidFill>
+                  <a:srgbClr val="00B0F0"/>
+                </a:solidFill>
+              </a:rPr>
+              <a:t>Clarify</a:t>
+            </a:r>
+            <a:r>
+              <a:rPr lang="en-US" dirty="0" smtClean="0">
+                <a:solidFill>
+                  <a:srgbClr val="00B0F0"/>
+                </a:solidFill>
+              </a:rPr>
               <a:t> </a:t>
             </a:r>
             <a:r>
-              <a:rPr lang="fr-FR" dirty="0" err="1" smtClean="0"/>
-              <a:t>upon</a:t>
-            </a:r>
-            <a:r>
-              <a:rPr lang="fr-FR" dirty="0" smtClean="0"/>
-              <a:t> </a:t>
-            </a:r>
-            <a:r>
-              <a:rPr lang="fr-FR" dirty="0" err="1" smtClean="0"/>
-              <a:t>legacy</a:t>
-            </a:r>
-            <a:r>
-              <a:rPr lang="fr-FR" dirty="0" smtClean="0"/>
-              <a:t> DNS options</a:t>
-            </a:r>
-          </a:p>
-          <a:p>
-            <a:r>
-              <a:rPr lang="fr-FR" dirty="0" err="1" smtClean="0"/>
-              <a:t>Generalize</a:t>
-            </a:r>
-            <a:r>
-              <a:rPr lang="fr-FR" dirty="0" smtClean="0"/>
-              <a:t> the </a:t>
-            </a:r>
-            <a:r>
-              <a:rPr lang="fr-FR" dirty="0" err="1" smtClean="0"/>
-              <a:t>specification</a:t>
-            </a:r>
-            <a:endParaRPr lang="fr-FR" dirty="0" smtClean="0"/>
-          </a:p>
-          <a:p>
-            <a:pPr lvl="1"/>
-            <a:r>
-              <a:rPr lang="fr-FR" dirty="0" err="1" smtClean="0"/>
-              <a:t>Remove</a:t>
-            </a:r>
-            <a:r>
-              <a:rPr lang="fr-FR" dirty="0" smtClean="0"/>
-              <a:t> </a:t>
-            </a:r>
-            <a:r>
-              <a:rPr lang="fr-FR" dirty="0" err="1" smtClean="0"/>
-              <a:t>deployment</a:t>
-            </a:r>
-            <a:r>
-              <a:rPr lang="fr-FR" dirty="0" smtClean="0"/>
-              <a:t> </a:t>
-            </a:r>
-            <a:r>
-              <a:rPr lang="fr-FR" dirty="0" err="1" smtClean="0"/>
-              <a:t>considerations</a:t>
-            </a:r>
-            <a:endParaRPr lang="fr-FR" dirty="0" smtClean="0"/>
-          </a:p>
-          <a:p>
-            <a:r>
-              <a:rPr lang="fr-FR" dirty="0" smtClean="0"/>
-              <a:t>Position the </a:t>
-            </a:r>
-            <a:r>
-              <a:rPr lang="fr-FR" dirty="0" err="1" smtClean="0"/>
-              <a:t>draft</a:t>
-            </a:r>
-            <a:r>
-              <a:rPr lang="fr-FR" dirty="0" smtClean="0"/>
-              <a:t> vs. DEER</a:t>
-            </a:r>
-          </a:p>
-          <a:p>
-            <a:endParaRPr lang="fr-FR" dirty="0"/>
-          </a:p>
-          <a:p>
-            <a:r>
-              <a:rPr lang="fr-FR" dirty="0" smtClean="0"/>
-              <a:t>TBC</a:t>
-            </a:r>
+              <a:rPr lang="en-US" dirty="0" smtClean="0"/>
+              <a:t>the relationship with DEER</a:t>
+            </a:r>
+            <a:endParaRPr lang="en-US" dirty="0" smtClean="0"/>
           </a:p>
         </p:txBody>
       </p:sp>
@@ -4639,8 +4714,8 @@
         </p:nvSpPr>
         <p:spPr>
           <a:xfrm>
-            <a:off x="313184" y="1268760"/>
-            <a:ext cx="4618856" cy="3816424"/>
+            <a:off x="59196" y="1268760"/>
+            <a:ext cx="5304892" cy="3816424"/>
           </a:xfrm>
         </p:spPr>
         <p:txBody>
@@ -4651,32 +4726,55 @@
           <a:p>
             <a:r>
               <a:rPr lang="en-US" sz="2000" dirty="0" smtClean="0"/>
-              <a:t>There are some trade-offs </a:t>
-            </a:r>
-            <a:endParaRPr lang="en-US" sz="2000" dirty="0" smtClean="0"/>
+              <a:t>Why? </a:t>
+            </a:r>
           </a:p>
           <a:p>
             <a:pPr lvl="1"/>
             <a:r>
+              <a:rPr lang="en-US" sz="1600" dirty="0" smtClean="0"/>
+              <a:t>Provide a customized DNS configuration within a local network</a:t>
+            </a:r>
+          </a:p>
+          <a:p>
+            <a:r>
+              <a:rPr lang="en-US" sz="2000" dirty="0" smtClean="0"/>
+              <a:t>There are trade-offs </a:t>
+            </a:r>
+          </a:p>
+          <a:p>
+            <a:pPr lvl="1"/>
+            <a:r>
               <a:rPr lang="en-US" sz="1800" dirty="0" smtClean="0"/>
-              <a:t>Some Issues</a:t>
+              <a:t>Some issues</a:t>
             </a:r>
           </a:p>
           <a:p>
             <a:pPr lvl="2"/>
             <a:r>
               <a:rPr lang="en-US" sz="1400" dirty="0" smtClean="0"/>
-              <a:t>Create </a:t>
+              <a:t>Create a </a:t>
+            </a:r>
+            <a:r>
+              <a:rPr lang="en-US" sz="1400" b="1" i="1" dirty="0" smtClean="0">
+                <a:solidFill>
+                  <a:srgbClr val="00B0F0"/>
+                </a:solidFill>
+              </a:rPr>
+              <a:t>dependency</a:t>
+            </a:r>
+            <a:r>
+              <a:rPr lang="en-US" sz="1400" dirty="0" smtClean="0">
+                <a:solidFill>
+                  <a:srgbClr val="00B0F0"/>
+                </a:solidFill>
+              </a:rPr>
+              <a:t> </a:t>
             </a:r>
             <a:r>
               <a:rPr lang="en-US" sz="1400" dirty="0" smtClean="0"/>
-              <a:t>a dependency between DHCP servers (access routers) and DoH </a:t>
-            </a:r>
-            <a:r>
-              <a:rPr lang="en-US" sz="1400" dirty="0" smtClean="0"/>
-              <a:t>resolvers</a:t>
-            </a:r>
-            <a:endParaRPr lang="en-US" sz="1400" dirty="0" smtClean="0"/>
+              <a:t>between DHCP servers (access routers) and DoH resolvers</a:t>
+            </a:r>
           </a:p>
           <a:p>
             <a:pPr lvl="2"/>
@@ -4685,90 +4783,126 @@
               <a:t>May </a:t>
             </a:r>
             <a:r>
+              <a:rPr lang="en-US" sz="1400" b="1" i="1" dirty="0" smtClean="0">
+                <a:solidFill>
+                  <a:srgbClr val="00B0F0"/>
+                </a:solidFill>
+              </a:rPr>
+              <a:t>increase the size </a:t>
+            </a:r>
+            <a:r>
               <a:rPr lang="en-US" sz="1400" dirty="0" smtClean="0"/>
-              <a:t>increase the size of RA/DHCP </a:t>
-            </a:r>
+              <a:t>of RA/DHCP messages</a:t>
+            </a:r>
+          </a:p>
+          <a:p>
+            <a:pPr lvl="1"/>
+            <a:r>
+              <a:rPr lang="en-US" sz="1800" dirty="0" smtClean="0"/>
+              <a:t>Some advantages</a:t>
+            </a:r>
+          </a:p>
+          <a:p>
+            <a:pPr lvl="2"/>
+            <a:r>
+              <a:rPr lang="en-US" sz="1400" dirty="0"/>
+              <a:t>Fills a void as there is </a:t>
+            </a:r>
+            <a:r>
+              <a:rPr lang="en-US" sz="1400" b="1" i="1" dirty="0">
+                <a:solidFill>
+                  <a:srgbClr val="00B0F0"/>
+                </a:solidFill>
+              </a:rPr>
+              <a:t>no standard</a:t>
+            </a:r>
+            <a:r>
+              <a:rPr lang="en-US" sz="1400" dirty="0">
+                <a:solidFill>
+                  <a:srgbClr val="00B0F0"/>
+                </a:solidFill>
+              </a:rPr>
+              <a:t> </a:t>
+            </a:r>
+            <a:r>
+              <a:rPr lang="en-US" sz="1400" dirty="0"/>
+              <a:t>means to retrieve the URI information from the DoH server</a:t>
+            </a:r>
+          </a:p>
+          <a:p>
+            <a:pPr lvl="2"/>
             <a:r>
               <a:rPr lang="en-US" sz="1400" dirty="0" smtClean="0"/>
-              <a:t>messages</a:t>
-            </a:r>
-          </a:p>
-          <a:p>
-            <a:pPr lvl="1"/>
-            <a:r>
-              <a:rPr lang="en-US" sz="1800" dirty="0" smtClean="0"/>
-              <a:t>Some </a:t>
-            </a:r>
-            <a:r>
-              <a:rPr lang="en-US" sz="1800" dirty="0" smtClean="0"/>
-              <a:t>advantages</a:t>
-            </a:r>
+              <a:t>Clients can </a:t>
+            </a:r>
+            <a:r>
+              <a:rPr lang="en-US" sz="1400" b="1" i="1" dirty="0" smtClean="0">
+                <a:solidFill>
+                  <a:srgbClr val="00B0F0"/>
+                </a:solidFill>
+              </a:rPr>
+              <a:t>immediately use</a:t>
+            </a:r>
+            <a:r>
+              <a:rPr lang="en-US" sz="1400" dirty="0" smtClean="0">
+                <a:solidFill>
+                  <a:srgbClr val="00B0F0"/>
+                </a:solidFill>
+              </a:rPr>
+              <a:t> </a:t>
+            </a:r>
+            <a:r>
+              <a:rPr lang="en-US" sz="1400" dirty="0" smtClean="0"/>
+              <a:t>the service(s); no need for extra queries to retrieve the URIs</a:t>
+            </a:r>
+            <a:endParaRPr lang="en-US" sz="1000" dirty="0" smtClean="0"/>
           </a:p>
           <a:p>
             <a:pPr lvl="2"/>
             <a:r>
+              <a:rPr lang="en-US" sz="1400" dirty="0" smtClean="0"/>
+              <a:t>Does </a:t>
+            </a:r>
+            <a:r>
+              <a:rPr lang="en-US" sz="1400" b="1" i="1" dirty="0" smtClean="0">
+                <a:solidFill>
+                  <a:srgbClr val="00B0F0"/>
+                </a:solidFill>
+              </a:rPr>
+              <a:t>not interfere </a:t>
+            </a:r>
+            <a:r>
+              <a:rPr lang="en-US" sz="1400" dirty="0" smtClean="0"/>
+              <a:t>with DNS exchanges to “customize” the available services </a:t>
+            </a:r>
+          </a:p>
+          <a:p>
+            <a:pPr lvl="2"/>
+            <a:r>
               <a:rPr lang="en-US" sz="1400" dirty="0"/>
-              <a:t>There is no standard means to retrieve such information from the </a:t>
-            </a:r>
-            <a:r>
-              <a:rPr lang="en-US" sz="1400" dirty="0" smtClean="0"/>
-              <a:t>DoH server</a:t>
-            </a:r>
-            <a:endParaRPr lang="en-US" sz="1400" dirty="0"/>
-          </a:p>
-          <a:p>
-            <a:pPr lvl="2"/>
-            <a:r>
-              <a:rPr lang="en-US" sz="1400" dirty="0" smtClean="0"/>
-              <a:t>Clients </a:t>
-            </a:r>
-            <a:r>
-              <a:rPr lang="en-US" sz="1400" dirty="0"/>
-              <a:t>can immediately use the service(s</a:t>
-            </a:r>
-            <a:r>
-              <a:rPr lang="en-US" sz="1400" dirty="0" smtClean="0"/>
-              <a:t>)</a:t>
-            </a:r>
-          </a:p>
-          <a:p>
-            <a:pPr lvl="2"/>
-            <a:r>
-              <a:rPr lang="en-US" sz="1400" dirty="0" smtClean="0"/>
-              <a:t>No need for extra queries to retrieve the URIs</a:t>
-            </a:r>
-          </a:p>
-          <a:p>
-            <a:pPr lvl="2"/>
-            <a:r>
-              <a:rPr lang="fr-FR" sz="1400" dirty="0" err="1" smtClean="0"/>
-              <a:t>Allows</a:t>
-            </a:r>
-            <a:r>
-              <a:rPr lang="fr-FR" sz="1400" dirty="0" smtClean="0"/>
-              <a:t> </a:t>
-            </a:r>
-            <a:r>
-              <a:rPr lang="fr-FR" sz="1400" dirty="0" smtClean="0"/>
-              <a:t>for </a:t>
-            </a:r>
-            <a:r>
-              <a:rPr lang="fr-FR" sz="1400" dirty="0" err="1" smtClean="0"/>
-              <a:t>customized</a:t>
-            </a:r>
-            <a:r>
-              <a:rPr lang="fr-FR" sz="1400" dirty="0" smtClean="0"/>
-              <a:t> </a:t>
-            </a:r>
-            <a:r>
-              <a:rPr lang="fr-FR" sz="1400" dirty="0" smtClean="0"/>
-              <a:t>(local) </a:t>
-            </a:r>
-            <a:r>
-              <a:rPr lang="fr-FR" sz="1400" dirty="0" smtClean="0"/>
-              <a:t>configuration</a:t>
-            </a:r>
-            <a:endParaRPr lang="fr-FR" sz="1400" dirty="0" smtClean="0"/>
+              <a:t>It is not susceptible to </a:t>
+            </a:r>
+            <a:r>
+              <a:rPr lang="en-US" sz="1400" b="1" i="1" dirty="0">
+                <a:solidFill>
+                  <a:srgbClr val="00B0F0"/>
+                </a:solidFill>
+              </a:rPr>
+              <a:t>external </a:t>
+            </a:r>
+            <a:r>
+              <a:rPr lang="en-US" sz="1400" b="1" i="1" dirty="0" smtClean="0">
+                <a:solidFill>
+                  <a:srgbClr val="00B0F0"/>
+                </a:solidFill>
+              </a:rPr>
+              <a:t>attacks</a:t>
+            </a:r>
+            <a:endParaRPr lang="en-US" sz="1400" b="1" i="1" dirty="0">
+              <a:solidFill>
+                <a:srgbClr val="00B0F0"/>
+              </a:solidFill>
+            </a:endParaRPr>
           </a:p>
           <a:p>
             <a:pPr marL="0" indent="0">
@@ -4822,12 +4956,20 @@
           <a:lstStyle/>
           <a:p>
             <a:r>
-              <a:rPr lang="fr-FR" sz="2000" dirty="0" smtClean="0">
+              <a:rPr lang="en-US" sz="2000" b="1" dirty="0" smtClean="0">
                 <a:solidFill>
                   <a:schemeClr val="tx1"/>
                 </a:solidFill>
               </a:rPr>
-              <a:t>Suggestion:</a:t>
+              <a:t>Suggestions</a:t>
+            </a:r>
+            <a:r>
+              <a:rPr lang="en-US" sz="2000" dirty="0" smtClean="0">
+                <a:solidFill>
+                  <a:schemeClr val="tx1"/>
+                </a:solidFill>
+              </a:rPr>
+              <a:t>:</a:t>
             </a:r>
           </a:p>
           <a:p>
@@ -4836,142 +4978,33 @@
               <a:buChar char="•"/>
             </a:pPr>
             <a:r>
-              <a:rPr lang="fr-FR" sz="2000" dirty="0" err="1" smtClean="0">
+              <a:rPr lang="en-US" sz="2000" dirty="0" smtClean="0">
                 <a:solidFill>
                   <a:schemeClr val="tx1"/>
                 </a:solidFill>
               </a:rPr>
-              <a:t>Define</a:t>
-            </a:r>
-            <a:r>
-              <a:rPr lang="fr-FR" sz="2000" dirty="0" smtClean="0">
+              <a:t>Define RA/DHCP options to convey URI Templates</a:t>
+            </a:r>
+          </a:p>
+          <a:p>
+            <a:pPr marL="285750" indent="-285750">
+              <a:buFont typeface="Arial" panose="020B0604020202020204" pitchFamily="34" charset="0"/>
+              <a:buChar char="•"/>
+            </a:pPr>
+            <a:r>
+              <a:rPr lang="en-US" sz="2000" dirty="0" smtClean="0">
                 <a:solidFill>
                   <a:schemeClr val="tx1"/>
                 </a:solidFill>
               </a:rPr>
-              <a:t> RA/DHCP Options to </a:t>
-            </a:r>
-            <a:r>
-              <a:rPr lang="fr-FR" sz="2000" dirty="0" err="1" smtClean="0">
-                <a:solidFill>
-                  <a:schemeClr val="tx1"/>
-                </a:solidFill>
-              </a:rPr>
-              <a:t>convey</a:t>
-            </a:r>
-            <a:r>
-              <a:rPr lang="fr-FR" sz="2000" dirty="0" smtClean="0">
-                <a:solidFill>
-                  <a:schemeClr val="tx1"/>
-                </a:solidFill>
-              </a:rPr>
-              <a:t> URI </a:t>
-            </a:r>
-            <a:r>
-              <a:rPr lang="fr-FR" sz="2000" dirty="0" err="1" smtClean="0">
-                <a:solidFill>
-                  <a:schemeClr val="tx1"/>
-                </a:solidFill>
-              </a:rPr>
-              <a:t>Templates</a:t>
-            </a:r>
-            <a:endParaRPr lang="fr-FR" sz="2000" dirty="0" smtClean="0">
+              <a:t>These options, when available, take precedence over DEER</a:t>
+            </a:r>
+            <a:endParaRPr lang="en-US" sz="2000" dirty="0">
               <a:solidFill>
                 <a:schemeClr val="tx1"/>
               </a:solidFill>
             </a:endParaRPr>
           </a:p>
-          <a:p>
-            <a:pPr marL="285750" indent="-285750">
-              <a:buFont typeface="Arial" panose="020B0604020202020204" pitchFamily="34" charset="0"/>
-              <a:buChar char="•"/>
-            </a:pPr>
-            <a:r>
-              <a:rPr lang="fr-FR" sz="2000" dirty="0" err="1" smtClean="0">
-                <a:solidFill>
-                  <a:schemeClr val="tx1"/>
-                </a:solidFill>
-              </a:rPr>
-              <a:t>These</a:t>
-            </a:r>
-            <a:r>
-              <a:rPr lang="fr-FR" sz="2000" dirty="0" smtClean="0">
-                <a:solidFill>
-                  <a:schemeClr val="tx1"/>
-                </a:solidFill>
-              </a:rPr>
-              <a:t> options, </a:t>
-            </a:r>
-            <a:r>
-              <a:rPr lang="fr-FR" sz="2000" dirty="0" err="1" smtClean="0">
-                <a:solidFill>
-                  <a:schemeClr val="tx1"/>
-                </a:solidFill>
-              </a:rPr>
-              <a:t>when</a:t>
-            </a:r>
-            <a:r>
-              <a:rPr lang="fr-FR" sz="2000" dirty="0" smtClean="0">
-                <a:solidFill>
-                  <a:schemeClr val="tx1"/>
-                </a:solidFill>
-              </a:rPr>
-              <a:t> </a:t>
-            </a:r>
-            <a:r>
-              <a:rPr lang="fr-FR" sz="2000" dirty="0" err="1" smtClean="0">
-                <a:solidFill>
-                  <a:schemeClr val="tx1"/>
-                </a:solidFill>
-              </a:rPr>
-              <a:t>available</a:t>
-            </a:r>
-            <a:r>
-              <a:rPr lang="fr-FR" sz="2000" dirty="0" smtClean="0">
-                <a:solidFill>
-                  <a:schemeClr val="tx1"/>
-                </a:solidFill>
-              </a:rPr>
-              <a:t>, </a:t>
-            </a:r>
-            <a:r>
-              <a:rPr lang="fr-FR" sz="2000" dirty="0" err="1" smtClean="0">
-                <a:solidFill>
-                  <a:schemeClr val="tx1"/>
-                </a:solidFill>
-              </a:rPr>
-              <a:t>take</a:t>
-            </a:r>
-            <a:r>
-              <a:rPr lang="fr-FR" sz="2000" dirty="0" smtClean="0">
-                <a:solidFill>
-                  <a:schemeClr val="tx1"/>
-                </a:solidFill>
-              </a:rPr>
-              <a:t> </a:t>
-            </a:r>
-            <a:r>
-              <a:rPr lang="fr-FR" sz="2000" dirty="0" err="1" smtClean="0">
-                <a:solidFill>
-                  <a:schemeClr val="tx1"/>
-                </a:solidFill>
-              </a:rPr>
-              <a:t>precedence</a:t>
-            </a:r>
-            <a:r>
-              <a:rPr lang="fr-FR" sz="2000" dirty="0" smtClean="0">
-                <a:solidFill>
-                  <a:schemeClr val="tx1"/>
-                </a:solidFill>
-              </a:rPr>
-              <a:t> over RESINFO/DEER</a:t>
-            </a:r>
-            <a:endParaRPr lang="fr-FR" sz="2000" dirty="0">
-              <a:solidFill>
-                <a:schemeClr val="tx1"/>
-              </a:solidFill>
-            </a:endParaRPr>
-          </a:p>
         </p:txBody>
       </p:sp>
       <p:sp>
@@ -4982,7 +5015,7 @@
         </p:nvSpPr>
         <p:spPr>
           <a:xfrm>
-            <a:off x="5033080" y="1124744"/>
+            <a:off x="5364088" y="1124744"/>
             <a:ext cx="3715384" cy="4459634"/>
           </a:xfrm>
           <a:prstGeom prst="rect">
@@ -5032,7 +5065,7 @@
         </p:nvSpPr>
         <p:spPr>
           <a:xfrm>
-            <a:off x="5422448" y="2919700"/>
+            <a:off x="5681448" y="2919700"/>
             <a:ext cx="952825" cy="863250"/>
           </a:xfrm>
           <a:prstGeom prst="cloud">
@@ -5076,7 +5109,7 @@
         </p:nvSpPr>
         <p:spPr>
           <a:xfrm>
-            <a:off x="6278239" y="3229155"/>
+            <a:off x="6537239" y="3229155"/>
             <a:ext cx="294834" cy="307407"/>
           </a:xfrm>
           <a:prstGeom prst="roundRect">
@@ -5127,7 +5160,7 @@
         </p:nvCxnSpPr>
         <p:spPr>
           <a:xfrm>
-            <a:off x="6573073" y="3382859"/>
+            <a:off x="6832073" y="3382859"/>
             <a:ext cx="470873" cy="0"/>
           </a:xfrm>
           <a:prstGeom prst="line">
@@ -5157,7 +5190,7 @@
         </p:nvSpPr>
         <p:spPr>
           <a:xfrm>
-            <a:off x="6953863" y="2700796"/>
+            <a:off x="7212863" y="2700796"/>
             <a:ext cx="1576457" cy="1211545"/>
           </a:xfrm>
           <a:prstGeom prst="cloud">
@@ -5214,7 +5247,7 @@
         </p:nvSpPr>
         <p:spPr>
           <a:xfrm>
-            <a:off x="5152198" y="3292706"/>
+            <a:off x="5411198" y="3292706"/>
             <a:ext cx="165075" cy="161739"/>
           </a:xfrm>
           <a:prstGeom prst="ellipse">
@@ -5275,7 +5308,7 @@
         </p:nvCxnSpPr>
         <p:spPr>
           <a:xfrm flipV="1">
-            <a:off x="5317273" y="3351325"/>
+            <a:off x="5576273" y="3351325"/>
             <a:ext cx="108130" cy="22251"/>
           </a:xfrm>
           <a:prstGeom prst="line">
@@ -5305,7 +5338,7 @@
         </p:nvGrpSpPr>
         <p:grpSpPr>
           <a:xfrm>
-            <a:off x="7219120" y="3412118"/>
+            <a:off x="7478120" y="3412118"/>
             <a:ext cx="788228" cy="784387"/>
             <a:chOff x="2699792" y="4365104"/>
             <a:chExt cx="1152128" cy="2016224"/>
@@ -5546,7 +5579,7 @@
         </p:nvCxnSpPr>
         <p:spPr>
           <a:xfrm>
-            <a:off x="6638572" y="3278844"/>
+            <a:off x="6897572" y="3278844"/>
             <a:ext cx="270250" cy="0"/>
           </a:xfrm>
           <a:prstGeom prst="straightConnector1">
@@ -5583,7 +5616,7 @@
         </p:nvSpPr>
         <p:spPr>
           <a:xfrm>
-            <a:off x="6503445" y="4024397"/>
+            <a:off x="6762445" y="4024397"/>
             <a:ext cx="2164066" cy="1039626"/>
           </a:xfrm>
           <a:prstGeom prst="wedgeEllipseCallout">
@@ -5621,12 +5654,10 @@
           <a:bodyPr rtlCol="0" anchor="ctr"/>
           <a:lstStyle/>
           <a:p>
-            <a:pPr algn="ctr">
-              <a:buAutoNum type="arabicParenBoth"/>
-            </a:pPr>
+            <a:pPr algn="ctr"/>
             <a:r>
               <a:rPr lang="fr-FR" sz="900" dirty="0" smtClean="0"/>
-              <a:t>An </a:t>
+              <a:t>(2) An </a:t>
             </a:r>
             <a:r>
               <a:rPr lang="fr-FR" sz="900" dirty="0" err="1" smtClean="0"/>
@@ -5646,24 +5677,29 @@
             </a:r>
             <a:r>
               <a:rPr lang="fr-FR" sz="900" dirty="0" err="1" smtClean="0"/>
-              <a:t>policies</a:t>
+              <a:t>policy</a:t>
             </a:r>
             <a:r>
               <a:rPr lang="fr-FR" sz="900" dirty="0" smtClean="0"/>
               <a:t>: </a:t>
             </a:r>
+            <a:endParaRPr lang="fr-FR" sz="900" dirty="0" smtClean="0"/>
           </a:p>
           <a:p>
             <a:pPr algn="ctr"/>
             <a:r>
+              <a:rPr lang="fr-FR" sz="900" dirty="0" smtClean="0"/>
+              <a:t>All </a:t>
+            </a:r>
+            <a:r>
               <a:rPr lang="fr-FR" sz="900" dirty="0" err="1" smtClean="0"/>
-              <a:t>C</a:t>
+              <a:t>Hosts</a:t>
             </a:r>
             <a:r>
               <a:rPr lang="fr-FR" sz="900" dirty="0" err="1" smtClean="0">
                 <a:sym typeface="Wingdings" panose="05000000000000000000" pitchFamily="2" charset="2"/>
               </a:rPr>
-              <a:t>parental</a:t>
+              <a:t>malware</a:t>
             </a:r>
             <a:r>
               <a:rPr lang="fr-FR" sz="900" dirty="0" smtClean="0">
@@ -5676,18 +5712,6 @@
                 <a:sym typeface="Wingdings" panose="05000000000000000000" pitchFamily="2" charset="2"/>
               </a:rPr>
               <a:t>filtering</a:t>
-            </a:r>
-            <a:endParaRPr lang="fr-FR" sz="900" dirty="0" smtClean="0">
-              <a:sym typeface="Wingdings" panose="05000000000000000000" pitchFamily="2" charset="2"/>
-            </a:endParaRPr>
-          </a:p>
-          <a:p>
-            <a:pPr algn="ctr"/>
-            <a:r>
-              <a:rPr lang="fr-FR" sz="900" dirty="0" err="1" smtClean="0">
-                <a:sym typeface="Wingdings" panose="05000000000000000000" pitchFamily="2" charset="2"/>
-              </a:rPr>
-              <a:t>Elseno-filtering</a:t>
             </a:r>
             <a:endParaRPr lang="en-US" sz="900" dirty="0"/>
           </a:p>
@@ -5701,7 +5725,7 @@
         </p:nvCxnSpPr>
         <p:spPr>
           <a:xfrm>
-            <a:off x="5372285" y="3278844"/>
+            <a:off x="5631285" y="3278844"/>
             <a:ext cx="857198" cy="9827"/>
           </a:xfrm>
           <a:prstGeom prst="straightConnector1">
@@ -5738,7 +5762,7 @@
         </p:nvSpPr>
         <p:spPr>
           <a:xfrm>
-            <a:off x="6591606" y="1702637"/>
+            <a:off x="6850606" y="1702637"/>
             <a:ext cx="1758547" cy="841044"/>
           </a:xfrm>
           <a:prstGeom prst="wedgeEllipseCallout">
@@ -5779,15 +5803,19 @@
             <a:pPr algn="ctr"/>
             <a:r>
               <a:rPr lang="en-US" sz="900" dirty="0" smtClean="0"/>
-              <a:t>(2) Receives a list of supported </a:t>
-            </a:r>
-            <a:r>
-              <a:rPr lang="en-US" sz="900" dirty="0" err="1" smtClean="0"/>
-              <a:t>DoH</a:t>
+              <a:t>(1) </a:t>
             </a:r>
             <a:r>
               <a:rPr lang="en-US" sz="900" dirty="0" smtClean="0"/>
-              <a:t> services (e.g., parental, no-filtering)</a:t>
+              <a:t>Receives a list of supported DoH services (e.g., </a:t>
+            </a:r>
+            <a:r>
+              <a:rPr lang="en-US" sz="900" dirty="0"/>
+              <a:t>malware filtering, </a:t>
+            </a:r>
+            <a:r>
+              <a:rPr lang="en-US" sz="900" dirty="0" smtClean="0"/>
+              <a:t>no-filtering)</a:t>
             </a:r>
             <a:endParaRPr lang="en-US" sz="900" dirty="0"/>
           </a:p>
@@ -5801,7 +5829,7 @@
         </p:nvSpPr>
         <p:spPr>
           <a:xfrm>
-            <a:off x="5110871" y="1508550"/>
+            <a:off x="5369871" y="1508550"/>
             <a:ext cx="1392575" cy="970435"/>
           </a:xfrm>
           <a:prstGeom prst="wedgeEllipseCallout">
@@ -5842,15 +5870,15 @@
             <a:pPr algn="ctr"/>
             <a:r>
               <a:rPr lang="en-US" sz="900" dirty="0" smtClean="0"/>
-              <a:t>(3) Communicates the “no-filtering” </a:t>
-            </a:r>
-            <a:r>
-              <a:rPr lang="en-US" sz="900" dirty="0" err="1" smtClean="0"/>
-              <a:t>DoH</a:t>
+              <a:t>(3) Communicates the </a:t>
             </a:r>
             <a:r>
               <a:rPr lang="en-US" sz="900" dirty="0" smtClean="0"/>
-              <a:t> server using DHCP URI option</a:t>
+              <a:t>“malware filtering” </a:t>
+            </a:r>
+            <a:r>
+              <a:rPr lang="en-US" sz="900" dirty="0" smtClean="0"/>
+              <a:t>DoH server using DHCP URI option</a:t>
             </a:r>
             <a:endParaRPr lang="en-US" sz="900" dirty="0"/>
           </a:p>
@@ -5864,7 +5892,7 @@
         </p:nvSpPr>
         <p:spPr>
           <a:xfrm>
-            <a:off x="5420769" y="3862658"/>
+            <a:off x="5679769" y="3862658"/>
             <a:ext cx="165075" cy="161739"/>
           </a:xfrm>
           <a:prstGeom prst="ellipse">
@@ -5899,12 +5927,12 @@
           <a:p>
             <a:pPr algn="ctr"/>
             <a:r>
-              <a:rPr lang="fr-FR" sz="700" dirty="0" smtClean="0">
+              <a:rPr lang="fr-FR" sz="700" dirty="0">
                 <a:solidFill>
                   <a:schemeClr val="tx1"/>
                 </a:solidFill>
               </a:rPr>
-              <a:t>C</a:t>
+              <a:t>H</a:t>
             </a:r>
             <a:endParaRPr lang="fr-FR" sz="700" dirty="0">
               <a:solidFill>
@@ -5925,7 +5953,7 @@
         </p:nvCxnSpPr>
         <p:spPr>
           <a:xfrm flipV="1">
-            <a:off x="5561669" y="3782031"/>
+            <a:off x="5820669" y="3782031"/>
             <a:ext cx="337191" cy="104313"/>
           </a:xfrm>
           <a:prstGeom prst="line">
@@ -5947,106 +5975,6 @@
           </a:fontRef>
         </p:style>
       </p:cxnSp>
-      <p:cxnSp>
-        <p:nvCxnSpPr>
-          <p:cNvPr id="26" name="Connecteur droit avec flèche 25"/>
-          <p:cNvCxnSpPr/>
-          <p:nvPr/>
-        </p:nvCxnSpPr>
-        <p:spPr>
-          <a:xfrm flipV="1">
-            <a:off x="5585844" y="3474403"/>
-            <a:ext cx="695948" cy="308548"/>
-          </a:xfrm>
-          <a:prstGeom prst="straightConnector1">
-            <a:avLst/>
-          </a:prstGeom>
-          <a:ln w="28575">
-            <a:solidFill>
-              <a:schemeClr val="tx1"/>
-            </a:solidFill>
-            <a:headEnd type="arrow"/>
-            <a:tailEnd type="arrow"/>
-          </a:ln>
-        </p:spPr>
-        <p:style>
-          <a:lnRef idx="1">
-            <a:schemeClr val="accent1"/>
-          </a:lnRef>
-          <a:fillRef idx="0">
-            <a:schemeClr val="accent1"/>
-          </a:fillRef>
-          <a:effectRef idx="0">
-            <a:schemeClr val="accent1"/>
-          </a:effectRef>
-          <a:fontRef idx="minor">
-            <a:schemeClr val="tx1"/>
-          </a:fontRef>
-        </p:style>
-      </p:cxnSp>
-      <p:sp>
-        <p:nvSpPr>
-          <p:cNvPr id="27" name="Bulle ronde 26"/>
-          <p:cNvSpPr/>
-          <p:nvPr/>
-        </p:nvSpPr>
-        <p:spPr>
-          <a:xfrm>
-            <a:off x="5033080" y="4290464"/>
-            <a:ext cx="1392575" cy="970435"/>
-          </a:xfrm>
-          <a:prstGeom prst="wedgeEllipseCallout">
-            <a:avLst>
-              <a:gd name="adj1" fmla="val 9143"/>
-              <a:gd name="adj2" fmla="val -104573"/>
-            </a:avLst>
-          </a:prstGeom>
-          <a:solidFill>
-            <a:schemeClr val="tx1"/>
-          </a:solidFill>
-          <a:ln>
-            <a:solidFill>
-              <a:schemeClr val="tx1"/>
-            </a:solidFill>
-          </a:ln>
-        </p:spPr>
-        <p:style>
-          <a:lnRef idx="2">
-            <a:schemeClr val="accent1">
-              <a:shade val="50000"/>
-            </a:schemeClr>
-          </a:lnRef>
-          <a:fillRef idx="1">
-            <a:schemeClr val="accent1"/>
-          </a:fillRef>
-          <a:effectRef idx="0">
-            <a:schemeClr val="accent1"/>
-          </a:effectRef>
-          <a:fontRef idx="minor">
-            <a:schemeClr val="lt1"/>
-          </a:fontRef>
-        </p:style>
-        <p:txBody>
-          <a:bodyPr rtlCol="0" anchor="ctr"/>
-          <a:lstStyle/>
-          <a:p>
-            <a:pPr algn="ctr"/>
-            <a:r>
-              <a:rPr lang="en-US" sz="900" dirty="0" smtClean="0"/>
-              <a:t>(3’) Communicates the “parental filtering” </a:t>
-            </a:r>
-            <a:r>
-              <a:rPr lang="en-US" sz="900" dirty="0" err="1" smtClean="0"/>
-              <a:t>DoH</a:t>
-            </a:r>
-            <a:r>
-              <a:rPr lang="en-US" sz="900" dirty="0" smtClean="0"/>
-              <a:t> server using DHCP URI option</a:t>
-            </a:r>
-            <a:endParaRPr lang="en-US" sz="900" dirty="0"/>
-          </a:p>
-        </p:txBody>
-      </p:sp>
       <p:sp>
         <p:nvSpPr>
           <p:cNvPr id="28" name="Rectangle 27"/>
@@ -6055,26 +5983,38 @@
         </p:nvSpPr>
         <p:spPr>
           <a:xfrm>
-            <a:off x="6808509" y="5280355"/>
-            <a:ext cx="1975221" cy="253916"/>
+            <a:off x="6684655" y="5280355"/>
+            <a:ext cx="2800504" cy="253916"/>
           </a:xfrm>
           <a:prstGeom prst="rect">
             <a:avLst/>
           </a:prstGeom>
         </p:spPr>
         <p:txBody>
-          <a:bodyPr wrap="none">
+          <a:bodyPr wrap="square">
             <a:spAutoFit/>
           </a:bodyPr>
           <a:lstStyle/>
           <a:p>
             <a:r>
-              <a:rPr lang="fr-FR" sz="1050" b="1" dirty="0" err="1"/>
+              <a:rPr lang="fr-FR" sz="1050" b="1" dirty="0" err="1" smtClean="0"/>
+              <a:t>Sample</a:t>
+            </a:r>
+            <a:r>
+              <a:rPr lang="fr-FR" sz="1050" b="1" dirty="0" smtClean="0"/>
+              <a:t> </a:t>
+            </a:r>
+            <a:r>
+              <a:rPr lang="fr-FR" sz="1050" b="1" dirty="0" err="1" smtClean="0"/>
               <a:t>Customized</a:t>
             </a:r>
             <a:r>
+              <a:rPr lang="fr-FR" sz="1050" b="1" dirty="0" smtClean="0"/>
+              <a:t> </a:t>
+            </a:r>
+            <a:r>
               <a:rPr lang="fr-FR" sz="1050" b="1" dirty="0"/>
-              <a:t> DHCP Configuration</a:t>
+              <a:t>DHCP Configuration</a:t>
             </a:r>
           </a:p>
         </p:txBody>
@@ -6132,22 +6072,10 @@
           <a:lstStyle/>
           <a:p>
             <a:r>
-              <a:rPr lang="fr-FR" dirty="0" smtClean="0"/>
-              <a:t>Question #2: No ADN </a:t>
-            </a:r>
-            <a:r>
-              <a:rPr lang="fr-FR" dirty="0" err="1" smtClean="0"/>
-              <a:t>is</a:t>
-            </a:r>
-            <a:r>
-              <a:rPr lang="fr-FR" dirty="0"/>
-              <a:t> </a:t>
-            </a:r>
-            <a:r>
-              <a:rPr lang="fr-FR" dirty="0" err="1" smtClean="0"/>
-              <a:t>Returned</a:t>
-            </a:r>
-            <a:endParaRPr lang="fr-FR" dirty="0"/>
+              <a:rPr lang="en-US" dirty="0" smtClean="0"/>
+              <a:t>Question #2: No @List is Returned</a:t>
+            </a:r>
+            <a:endParaRPr lang="en-US" dirty="0"/>
           </a:p>
         </p:txBody>
       </p:sp>
@@ -6167,92 +6095,10 @@
           <a:lstStyle/>
           <a:p>
             <a:r>
-              <a:rPr lang="fr-FR" dirty="0" err="1" smtClean="0"/>
-              <a:t>Accomodate</a:t>
-            </a:r>
-            <a:r>
-              <a:rPr lang="fr-FR" dirty="0" smtClean="0"/>
-              <a:t> cases </a:t>
-            </a:r>
-            <a:r>
-              <a:rPr lang="fr-FR" dirty="0" err="1" smtClean="0"/>
-              <a:t>where</a:t>
-            </a:r>
-            <a:r>
-              <a:rPr lang="fr-FR" dirty="0"/>
-              <a:t> </a:t>
-            </a:r>
-            <a:r>
-              <a:rPr lang="fr-FR" dirty="0" smtClean="0"/>
-              <a:t>an IP </a:t>
-            </a:r>
-            <a:r>
-              <a:rPr lang="fr-FR" dirty="0" err="1" smtClean="0"/>
-              <a:t>address</a:t>
-            </a:r>
-            <a:r>
-              <a:rPr lang="fr-FR" dirty="0" smtClean="0"/>
-              <a:t> </a:t>
-            </a:r>
-            <a:r>
-              <a:rPr lang="fr-FR" dirty="0" err="1" smtClean="0"/>
-              <a:t>is</a:t>
-            </a:r>
-            <a:r>
-              <a:rPr lang="fr-FR" dirty="0" smtClean="0"/>
-              <a:t> </a:t>
-            </a:r>
-            <a:r>
-              <a:rPr lang="fr-FR" dirty="0" err="1" smtClean="0"/>
-              <a:t>used</a:t>
-            </a:r>
-            <a:r>
-              <a:rPr lang="fr-FR" dirty="0" smtClean="0"/>
-              <a:t> as a </a:t>
-            </a:r>
-            <a:r>
-              <a:rPr lang="fr-FR" dirty="0" err="1" smtClean="0"/>
-              <a:t>reference</a:t>
-            </a:r>
-            <a:r>
-              <a:rPr lang="fr-FR" dirty="0" smtClean="0"/>
-              <a:t> identifier</a:t>
-            </a:r>
-          </a:p>
-          <a:p>
-            <a:r>
-              <a:rPr lang="fr-FR" dirty="0" err="1" smtClean="0"/>
-              <a:t>Should</a:t>
-            </a:r>
-            <a:r>
-              <a:rPr lang="fr-FR" dirty="0" smtClean="0"/>
-              <a:t> </a:t>
-            </a:r>
-            <a:r>
-              <a:rPr lang="fr-FR" dirty="0" err="1" smtClean="0"/>
-              <a:t>we</a:t>
-            </a:r>
-            <a:r>
-              <a:rPr lang="fr-FR" dirty="0" smtClean="0"/>
-              <a:t> </a:t>
-            </a:r>
-            <a:r>
-              <a:rPr lang="fr-FR" dirty="0" err="1" smtClean="0"/>
-              <a:t>discuss</a:t>
-            </a:r>
-            <a:r>
-              <a:rPr lang="fr-FR" dirty="0" smtClean="0"/>
-              <a:t> </a:t>
-            </a:r>
-            <a:r>
-              <a:rPr lang="fr-FR" dirty="0" err="1" smtClean="0"/>
-              <a:t>this</a:t>
-            </a:r>
-            <a:r>
-              <a:rPr lang="fr-FR" dirty="0" smtClean="0"/>
-              <a:t> case?</a:t>
-            </a:r>
-            <a:endParaRPr lang="fr-FR" dirty="0"/>
+              <a:rPr lang="en-US" dirty="0" smtClean="0"/>
+              <a:t>If the client receives a Do53 @List and an ADN, should the client use that list to resolve the ADN or should that list be assumed as locators of the encrypted DNS? </a:t>
+            </a:r>
+            <a:endParaRPr lang="en-US" dirty="0" smtClean="0"/>
           </a:p>
         </p:txBody>
       </p:sp>
@@ -6264,8 +6110,8 @@
         </p:nvSpPr>
         <p:spPr>
           <a:xfrm>
-            <a:off x="261864" y="5706504"/>
-            <a:ext cx="8424936" cy="1149291"/>
+            <a:off x="255929" y="5179953"/>
+            <a:ext cx="8424936" cy="1678047"/>
           </a:xfrm>
           <a:prstGeom prst="rect">
             <a:avLst/>
@@ -6300,12 +6146,20 @@
           <a:lstStyle/>
           <a:p>
             <a:r>
-              <a:rPr lang="fr-FR" sz="2000" dirty="0" smtClean="0">
+              <a:rPr lang="en-US" sz="2000" b="1" dirty="0" smtClean="0">
                 <a:solidFill>
                   <a:schemeClr val="tx1"/>
                 </a:solidFill>
               </a:rPr>
-              <a:t>Suggestion:</a:t>
+              <a:t>Suggestion</a:t>
+            </a:r>
+            <a:r>
+              <a:rPr lang="en-US" sz="2000" dirty="0" smtClean="0">
+                <a:solidFill>
+                  <a:schemeClr val="tx1"/>
+                </a:solidFill>
+              </a:rPr>
+              <a:t>:</a:t>
             </a:r>
           </a:p>
           <a:p>
@@ -6314,318 +6168,65 @@
               <a:buChar char="•"/>
             </a:pPr>
             <a:r>
-              <a:rPr lang="fr-FR" sz="2000" dirty="0" err="1" smtClean="0">
+              <a:rPr lang="en-US" sz="2000" dirty="0" smtClean="0">
                 <a:solidFill>
                   <a:schemeClr val="tx1"/>
                 </a:solidFill>
               </a:rPr>
-              <a:t>Add</a:t>
-            </a:r>
-            <a:r>
-              <a:rPr lang="fr-FR" sz="2000" dirty="0" smtClean="0">
+              <a:t>Recommend to always return a list of @</a:t>
+            </a:r>
+            <a:r>
+              <a:rPr lang="en-US" sz="2000" dirty="0" err="1" smtClean="0">
                 <a:solidFill>
                   <a:schemeClr val="tx1"/>
                 </a:solidFill>
               </a:rPr>
-              <a:t> </a:t>
-            </a:r>
-            <a:r>
-              <a:rPr lang="fr-FR" sz="2000" dirty="0" err="1" smtClean="0">
+              <a:t>es</a:t>
+            </a:r>
+            <a:r>
+              <a:rPr lang="en-US" sz="2000" dirty="0" smtClean="0">
                 <a:solidFill>
                   <a:schemeClr val="tx1"/>
                 </a:solidFill>
               </a:rPr>
-              <a:t>text</a:t>
-            </a:r>
-            <a:r>
-              <a:rPr lang="fr-FR" sz="2000" dirty="0" smtClean="0">
+              <a:t>, unless Do53 and encrypted DNS terminate on the same @</a:t>
+            </a:r>
+            <a:r>
+              <a:rPr lang="en-US" sz="2000" dirty="0" err="1" smtClean="0">
                 <a:solidFill>
                   <a:schemeClr val="tx1"/>
                 </a:solidFill>
               </a:rPr>
-              <a:t> to the </a:t>
-            </a:r>
-            <a:r>
-              <a:rPr lang="fr-FR" sz="2000" dirty="0" err="1" smtClean="0">
-                <a:solidFill>
-                  <a:schemeClr val="tx1"/>
-                </a:solidFill>
-              </a:rPr>
-              <a:t>draft</a:t>
-            </a:r>
-            <a:r>
-              <a:rPr lang="fr-FR" sz="2000" dirty="0" smtClean="0">
-                <a:solidFill>
-                  <a:schemeClr val="tx1"/>
-                </a:solidFill>
-              </a:rPr>
-              <a:t> to </a:t>
-            </a:r>
-            <a:r>
-              <a:rPr lang="fr-FR" sz="2000" dirty="0" err="1" smtClean="0">
-                <a:solidFill>
-                  <a:schemeClr val="tx1"/>
-                </a:solidFill>
-              </a:rPr>
-              <a:t>cover</a:t>
-            </a:r>
-            <a:r>
-              <a:rPr lang="fr-FR" sz="2000" dirty="0" smtClean="0">
-                <a:solidFill>
-                  <a:schemeClr val="tx1"/>
-                </a:solidFill>
-              </a:rPr>
-              <a:t> </a:t>
-            </a:r>
-            <a:r>
-              <a:rPr lang="fr-FR" sz="2000" dirty="0" err="1" smtClean="0">
-                <a:solidFill>
-                  <a:schemeClr val="tx1"/>
-                </a:solidFill>
-              </a:rPr>
-              <a:t>this</a:t>
-            </a:r>
-            <a:r>
-              <a:rPr lang="fr-FR" sz="2000" dirty="0" smtClean="0">
-                <a:solidFill>
-                  <a:schemeClr val="tx1"/>
-                </a:solidFill>
-              </a:rPr>
-              <a:t> case</a:t>
-            </a:r>
-            <a:endParaRPr lang="fr-FR" sz="2000" dirty="0">
+              <a:t>es</a:t>
+            </a:r>
+            <a:endParaRPr lang="en-US" sz="2000" dirty="0" smtClean="0">
               <a:solidFill>
                 <a:schemeClr val="tx1"/>
               </a:solidFill>
             </a:endParaRPr>
           </a:p>
-        </p:txBody>
-      </p:sp>
-    </p:spTree>
-    <p:extLst>
-      <p:ext uri="{BB962C8B-B14F-4D97-AF65-F5344CB8AC3E}">
-        <p14:creationId xmlns:p14="http://schemas.microsoft.com/office/powerpoint/2010/main" val="3157363650"/>
-      </p:ext>
-    </p:extLst>
-  </p:cSld>
-  <p:clrMapOvr>
-    <a:masterClrMapping/>
-  </p:clrMapOvr>
-  <p:timing>
-    <p:tnLst>
-      <p:par>
-        <p:cTn id="1" dur="indefinite" restart="never" nodeType="tmRoot"/>
-      </p:par>
-    </p:tnLst>
-  </p:timing>
-</p:sld>
-</file>
-
-<file path=ppt/slides/slide6.xml><?xml version="1.0" encoding="utf-8"?>
-<p:sld xmlns:a="http://schemas.openxmlformats.org/drawingml/2006/main" xmlns:r="http://schemas.openxmlformats.org/officeDocument/2006/relationships" xmlns:p="http://schemas.openxmlformats.org/presentationml/2006/main">
-  <p:cSld>
-    <p:spTree>
-      <p:nvGrpSpPr>
-        <p:cNvPr id="1" name=""/>
-        <p:cNvGrpSpPr/>
-        <p:nvPr/>
-      </p:nvGrpSpPr>
-      <p:grpSpPr>
-        <a:xfrm>
-          <a:off x="0" y="0"/>
-          <a:ext cx="0" cy="0"/>
-          <a:chOff x="0" y="0"/>
-          <a:chExt cx="0" cy="0"/>
-        </a:xfrm>
-      </p:grpSpPr>
-      <p:sp>
-        <p:nvSpPr>
-          <p:cNvPr id="2" name="Titre 1"/>
-          <p:cNvSpPr>
-            <a:spLocks noGrp="1"/>
-          </p:cNvSpPr>
-          <p:nvPr>
-            <p:ph type="title"/>
-          </p:nvPr>
-        </p:nvSpPr>
-        <p:spPr/>
-        <p:txBody>
-          <a:bodyPr/>
-          <a:lstStyle/>
-          <a:p>
-            <a:r>
-              <a:rPr lang="fr-FR" dirty="0" smtClean="0"/>
-              <a:t>Question #3: No @List </a:t>
-            </a:r>
-            <a:r>
-              <a:rPr lang="fr-FR" dirty="0" err="1" smtClean="0"/>
-              <a:t>is</a:t>
-            </a:r>
-            <a:r>
-              <a:rPr lang="fr-FR" dirty="0" smtClean="0"/>
-              <a:t> </a:t>
-            </a:r>
-            <a:r>
-              <a:rPr lang="fr-FR" dirty="0" err="1" smtClean="0"/>
-              <a:t>Returned</a:t>
-            </a:r>
-            <a:endParaRPr lang="fr-FR" dirty="0"/>
-          </a:p>
-        </p:txBody>
-      </p:sp>
-      <p:sp>
-        <p:nvSpPr>
-          <p:cNvPr id="3" name="Espace réservé du contenu 2"/>
-          <p:cNvSpPr>
-            <a:spLocks noGrp="1"/>
-          </p:cNvSpPr>
-          <p:nvPr>
-            <p:ph idx="1"/>
-          </p:nvPr>
-        </p:nvSpPr>
-        <p:spPr/>
-        <p:txBody>
-          <a:bodyPr/>
-          <a:lstStyle/>
-          <a:p>
-            <a:r>
-              <a:rPr lang="fr-FR" dirty="0" smtClean="0"/>
-              <a:t>If the client </a:t>
-            </a:r>
-            <a:r>
-              <a:rPr lang="fr-FR" dirty="0" err="1" smtClean="0"/>
-              <a:t>receives</a:t>
-            </a:r>
-            <a:r>
-              <a:rPr lang="fr-FR" dirty="0" smtClean="0"/>
-              <a:t> a Do53 @List and an ADN, </a:t>
-            </a:r>
-            <a:r>
-              <a:rPr lang="fr-FR" dirty="0" err="1" smtClean="0"/>
-              <a:t>should</a:t>
-            </a:r>
-            <a:r>
-              <a:rPr lang="fr-FR" dirty="0" smtClean="0"/>
-              <a:t> the client use </a:t>
-            </a:r>
-            <a:r>
-              <a:rPr lang="fr-FR" dirty="0" err="1" smtClean="0"/>
-              <a:t>that</a:t>
-            </a:r>
-            <a:r>
-              <a:rPr lang="fr-FR" dirty="0" smtClean="0"/>
-              <a:t> list to </a:t>
-            </a:r>
-            <a:r>
-              <a:rPr lang="fr-FR" dirty="0" err="1" smtClean="0"/>
-              <a:t>resolve</a:t>
-            </a:r>
-            <a:r>
-              <a:rPr lang="fr-FR" dirty="0" smtClean="0"/>
-              <a:t> the ADN or </a:t>
-            </a:r>
-            <a:r>
-              <a:rPr lang="fr-FR" dirty="0" err="1" smtClean="0"/>
-              <a:t>should</a:t>
-            </a:r>
-            <a:r>
-              <a:rPr lang="fr-FR" dirty="0" smtClean="0"/>
-              <a:t> </a:t>
-            </a:r>
-            <a:r>
-              <a:rPr lang="fr-FR" dirty="0" err="1" smtClean="0"/>
-              <a:t>that</a:t>
-            </a:r>
-            <a:r>
-              <a:rPr lang="fr-FR" dirty="0" smtClean="0"/>
-              <a:t> list </a:t>
-            </a:r>
-            <a:r>
-              <a:rPr lang="fr-FR" dirty="0" err="1" smtClean="0"/>
-              <a:t>be</a:t>
-            </a:r>
-            <a:r>
-              <a:rPr lang="fr-FR" dirty="0" smtClean="0"/>
-              <a:t> </a:t>
-            </a:r>
-            <a:r>
-              <a:rPr lang="fr-FR" dirty="0" err="1" smtClean="0"/>
-              <a:t>assumed</a:t>
-            </a:r>
-            <a:r>
-              <a:rPr lang="fr-FR" dirty="0" smtClean="0"/>
-              <a:t> as </a:t>
-            </a:r>
-            <a:r>
-              <a:rPr lang="fr-FR" dirty="0" err="1" smtClean="0"/>
-              <a:t>locators</a:t>
-            </a:r>
-            <a:r>
-              <a:rPr lang="fr-FR" dirty="0" smtClean="0"/>
-              <a:t> of the </a:t>
-            </a:r>
-            <a:r>
-              <a:rPr lang="fr-FR" dirty="0" err="1" smtClean="0"/>
-              <a:t>encrypted</a:t>
-            </a:r>
-            <a:r>
-              <a:rPr lang="fr-FR" dirty="0" smtClean="0"/>
-              <a:t>?   </a:t>
-            </a:r>
-          </a:p>
-        </p:txBody>
-      </p:sp>
-      <p:sp>
-        <p:nvSpPr>
-          <p:cNvPr id="4" name="Rectangle 3"/>
-          <p:cNvSpPr/>
-          <p:nvPr/>
-        </p:nvSpPr>
-        <p:spPr>
-          <a:xfrm>
-            <a:off x="255929" y="5179953"/>
-            <a:ext cx="8424936" cy="1149291"/>
-          </a:xfrm>
-          <a:prstGeom prst="rect">
-            <a:avLst/>
-          </a:prstGeom>
-          <a:solidFill>
-            <a:srgbClr val="92D050"/>
-          </a:solidFill>
-          <a:ln>
-            <a:solidFill>
-              <a:schemeClr val="bg1"/>
-            </a:solidFill>
-          </a:ln>
-        </p:spPr>
-        <p:style>
-          <a:lnRef idx="2">
-            <a:schemeClr val="accent1">
-              <a:shade val="50000"/>
-            </a:schemeClr>
-          </a:lnRef>
-          <a:fillRef idx="1">
-            <a:schemeClr val="accent1"/>
-          </a:fillRef>
-          <a:effectRef idx="0">
-            <a:schemeClr val="accent1"/>
-          </a:effectRef>
-          <a:fontRef idx="minor">
-            <a:schemeClr val="lt1"/>
-          </a:fontRef>
-        </p:style>
-        <p:txBody>
-          <a:bodyPr rtlCol="0" anchor="ctr"/>
-          <a:lstStyle/>
-          <a:p>
-            <a:r>
-              <a:rPr lang="fr-FR" sz="2000" dirty="0" smtClean="0">
+          <a:p>
+            <a:r>
+              <a:rPr lang="en-US" sz="2000" b="1" dirty="0" smtClean="0">
                 <a:solidFill>
                   <a:schemeClr val="tx1"/>
                 </a:solidFill>
               </a:rPr>
-              <a:t>Suggestion:</a:t>
-            </a:r>
+              <a:t>Motivation</a:t>
+            </a:r>
+            <a:r>
+              <a:rPr lang="en-US" sz="2000" dirty="0" smtClean="0">
+                <a:solidFill>
+                  <a:schemeClr val="tx1"/>
+                </a:solidFill>
+              </a:rPr>
+              <a:t>:</a:t>
+            </a:r>
+            <a:endParaRPr lang="en-US" sz="2000" dirty="0" smtClean="0">
+              <a:solidFill>
+                <a:schemeClr val="tx1"/>
+              </a:solidFill>
+            </a:endParaRPr>
           </a:p>
           <a:p>
             <a:pPr marL="285750" indent="-285750">
@@ -6633,110 +6234,14 @@
               <a:buChar char="•"/>
             </a:pPr>
             <a:r>
-              <a:rPr lang="fr-FR" sz="2000" dirty="0" err="1" smtClean="0">
+              <a:rPr lang="en-US" sz="2000" dirty="0" smtClean="0">
                 <a:solidFill>
                   <a:schemeClr val="tx1"/>
                 </a:solidFill>
               </a:rPr>
-              <a:t>Recommend</a:t>
-            </a:r>
-            <a:r>
-              <a:rPr lang="fr-FR" sz="2000" dirty="0" smtClean="0">
-                <a:solidFill>
-                  <a:schemeClr val="tx1"/>
-                </a:solidFill>
-              </a:rPr>
-              <a:t> to </a:t>
-            </a:r>
-            <a:r>
-              <a:rPr lang="fr-FR" sz="2000" dirty="0" err="1" smtClean="0">
-                <a:solidFill>
-                  <a:schemeClr val="tx1"/>
-                </a:solidFill>
-              </a:rPr>
-              <a:t>always</a:t>
-            </a:r>
-            <a:r>
-              <a:rPr lang="fr-FR" sz="2000" dirty="0" smtClean="0">
-                <a:solidFill>
-                  <a:schemeClr val="tx1"/>
-                </a:solidFill>
-              </a:rPr>
-              <a:t> return a list of @, </a:t>
-            </a:r>
-            <a:r>
-              <a:rPr lang="fr-FR" sz="2000" dirty="0" err="1" smtClean="0">
-                <a:solidFill>
-                  <a:schemeClr val="tx1"/>
-                </a:solidFill>
-              </a:rPr>
-              <a:t>unless</a:t>
-            </a:r>
-            <a:r>
-              <a:rPr lang="fr-FR" sz="2000" dirty="0">
-                <a:solidFill>
-                  <a:schemeClr val="tx1"/>
-                </a:solidFill>
-              </a:rPr>
-              <a:t> </a:t>
-            </a:r>
-            <a:r>
-              <a:rPr lang="fr-FR" sz="2000" dirty="0" smtClean="0">
-                <a:solidFill>
-                  <a:schemeClr val="tx1"/>
-                </a:solidFill>
-              </a:rPr>
-              <a:t>Do53 and </a:t>
-            </a:r>
-            <a:r>
-              <a:rPr lang="fr-FR" sz="2000" dirty="0" err="1" smtClean="0">
-                <a:solidFill>
-                  <a:schemeClr val="tx1"/>
-                </a:solidFill>
-              </a:rPr>
-              <a:t>encrypted</a:t>
-            </a:r>
-            <a:r>
-              <a:rPr lang="fr-FR" sz="2000" dirty="0" smtClean="0">
-                <a:solidFill>
-                  <a:schemeClr val="tx1"/>
-                </a:solidFill>
-              </a:rPr>
-              <a:t> DNS </a:t>
-            </a:r>
-            <a:r>
-              <a:rPr lang="fr-FR" sz="2000" dirty="0" err="1" smtClean="0">
-                <a:solidFill>
-                  <a:schemeClr val="tx1"/>
-                </a:solidFill>
-              </a:rPr>
-              <a:t>terminate</a:t>
-            </a:r>
-            <a:r>
-              <a:rPr lang="fr-FR" sz="2000" dirty="0" smtClean="0">
-                <a:solidFill>
-                  <a:schemeClr val="tx1"/>
-                </a:solidFill>
-              </a:rPr>
-              <a:t> on the </a:t>
-            </a:r>
-            <a:r>
-              <a:rPr lang="fr-FR" sz="2000" dirty="0" err="1" smtClean="0">
-                <a:solidFill>
-                  <a:schemeClr val="tx1"/>
-                </a:solidFill>
-              </a:rPr>
-              <a:t>same</a:t>
-            </a:r>
-            <a:r>
-              <a:rPr lang="fr-FR" sz="2000" dirty="0" smtClean="0">
-                <a:solidFill>
-                  <a:schemeClr val="tx1"/>
-                </a:solidFill>
-              </a:rPr>
-              <a:t> @</a:t>
-            </a:r>
-            <a:endParaRPr lang="fr-FR" sz="2000" dirty="0">
+              <a:t>Optimize the message size</a:t>
+            </a:r>
+            <a:endParaRPr lang="en-US" sz="2000" dirty="0">
               <a:solidFill>
                 <a:schemeClr val="tx1"/>
               </a:solidFill>
@@ -6764,165 +6269,7 @@
 </p:sld>
 </file>
 
-<file path=ppt/slides/slide7.xml><?xml version="1.0" encoding="utf-8"?>
-<p:sld xmlns:a="http://schemas.openxmlformats.org/drawingml/2006/main" xmlns:r="http://schemas.openxmlformats.org/officeDocument/2006/relationships" xmlns:p="http://schemas.openxmlformats.org/presentationml/2006/main">
-  <p:cSld>
-    <p:spTree>
-      <p:nvGrpSpPr>
-        <p:cNvPr id="1" name=""/>
-        <p:cNvGrpSpPr/>
-        <p:nvPr/>
-      </p:nvGrpSpPr>
-      <p:grpSpPr>
-        <a:xfrm>
-          <a:off x="0" y="0"/>
-          <a:ext cx="0" cy="0"/>
-          <a:chOff x="0" y="0"/>
-          <a:chExt cx="0" cy="0"/>
-        </a:xfrm>
-      </p:grpSpPr>
-      <p:sp>
-        <p:nvSpPr>
-          <p:cNvPr id="2" name="Titre 1"/>
-          <p:cNvSpPr>
-            <a:spLocks noGrp="1"/>
-          </p:cNvSpPr>
-          <p:nvPr>
-            <p:ph type="title"/>
-          </p:nvPr>
-        </p:nvSpPr>
-        <p:spPr/>
-        <p:txBody>
-          <a:bodyPr/>
-          <a:lstStyle/>
-          <a:p>
-            <a:r>
-              <a:rPr lang="fr-FR" dirty="0" smtClean="0"/>
-              <a:t>Question #</a:t>
-            </a:r>
-            <a:endParaRPr lang="fr-FR" dirty="0"/>
-          </a:p>
-        </p:txBody>
-      </p:sp>
-      <p:sp>
-        <p:nvSpPr>
-          <p:cNvPr id="3" name="Espace réservé du contenu 2"/>
-          <p:cNvSpPr>
-            <a:spLocks noGrp="1"/>
-          </p:cNvSpPr>
-          <p:nvPr>
-            <p:ph idx="1"/>
-          </p:nvPr>
-        </p:nvSpPr>
-        <p:spPr/>
-        <p:txBody>
-          <a:bodyPr/>
-          <a:lstStyle/>
-          <a:p>
-            <a:endParaRPr lang="fr-FR"/>
-          </a:p>
-        </p:txBody>
-      </p:sp>
-    </p:spTree>
-    <p:extLst>
-      <p:ext uri="{BB962C8B-B14F-4D97-AF65-F5344CB8AC3E}">
-        <p14:creationId xmlns:p14="http://schemas.microsoft.com/office/powerpoint/2010/main" val="4245555583"/>
-      </p:ext>
-    </p:extLst>
-  </p:cSld>
-  <p:clrMapOvr>
-    <a:masterClrMapping/>
-  </p:clrMapOvr>
-  <p:timing>
-    <p:tnLst>
-      <p:par>
-        <p:cTn id="1" dur="indefinite" restart="never" nodeType="tmRoot"/>
-      </p:par>
-    </p:tnLst>
-  </p:timing>
-</p:sld>
-</file>
-
-<file path=ppt/slides/slide8.xml><?xml version="1.0" encoding="utf-8"?>
-<p:sld xmlns:a="http://schemas.openxmlformats.org/drawingml/2006/main" xmlns:r="http://schemas.openxmlformats.org/officeDocument/2006/relationships" xmlns:p="http://schemas.openxmlformats.org/presentationml/2006/main">
-  <p:cSld>
-    <p:spTree>
-      <p:nvGrpSpPr>
-        <p:cNvPr id="1" name=""/>
-        <p:cNvGrpSpPr/>
-        <p:nvPr/>
-      </p:nvGrpSpPr>
-      <p:grpSpPr>
-        <a:xfrm>
-          <a:off x="0" y="0"/>
-          <a:ext cx="0" cy="0"/>
-          <a:chOff x="0" y="0"/>
-          <a:chExt cx="0" cy="0"/>
-        </a:xfrm>
-      </p:grpSpPr>
-      <p:sp>
-        <p:nvSpPr>
-          <p:cNvPr id="2" name="Titre 1"/>
-          <p:cNvSpPr>
-            <a:spLocks noGrp="1"/>
-          </p:cNvSpPr>
-          <p:nvPr>
-            <p:ph type="title"/>
-          </p:nvPr>
-        </p:nvSpPr>
-        <p:spPr/>
-        <p:txBody>
-          <a:bodyPr/>
-          <a:lstStyle/>
-          <a:p>
-            <a:r>
-              <a:rPr lang="fr-FR" dirty="0" smtClean="0"/>
-              <a:t>Question #</a:t>
-            </a:r>
-            <a:endParaRPr lang="fr-FR" dirty="0"/>
-          </a:p>
-        </p:txBody>
-      </p:sp>
-      <p:sp>
-        <p:nvSpPr>
-          <p:cNvPr id="3" name="Espace réservé du contenu 2"/>
-          <p:cNvSpPr>
-            <a:spLocks noGrp="1"/>
-          </p:cNvSpPr>
-          <p:nvPr>
-            <p:ph idx="1"/>
-          </p:nvPr>
-        </p:nvSpPr>
-        <p:spPr/>
-        <p:txBody>
-          <a:bodyPr/>
-          <a:lstStyle/>
-          <a:p>
-            <a:endParaRPr lang="fr-FR"/>
-          </a:p>
-        </p:txBody>
-      </p:sp>
-    </p:spTree>
-    <p:extLst>
-      <p:ext uri="{BB962C8B-B14F-4D97-AF65-F5344CB8AC3E}">
-        <p14:creationId xmlns:p14="http://schemas.microsoft.com/office/powerpoint/2010/main" val="2407809701"/>
-      </p:ext>
-    </p:extLst>
-  </p:cSld>
-  <p:clrMapOvr>
-    <a:masterClrMapping/>
-  </p:clrMapOvr>
-  <p:timing>
-    <p:tnLst>
-      <p:par>
-        <p:cTn id="1" dur="indefinite" restart="never" nodeType="tmRoot"/>
-      </p:par>
-    </p:tnLst>
-  </p:timing>
-</p:sld>
-</file>
-
-<file path=ppt/slides/slide9.xml><?xml version="1.0" encoding="utf-8"?>
+<file path=ppt/slides/slide6.xml><?xml version="1.0" encoding="utf-8"?>
 <p:sld xmlns:a="http://schemas.openxmlformats.org/drawingml/2006/main" xmlns:r="http://schemas.openxmlformats.org/officeDocument/2006/relationships" xmlns:p="http://schemas.openxmlformats.org/presentationml/2006/main">
   <p:cSld>
     <p:spTree>

</xml_diff>